<commit_message>
Removed somes questions and changes
</commit_message>
<xml_diff>
--- a/slides/MonetDB workshop.pptx
+++ b/slides/MonetDB workshop.pptx
@@ -248,11 +248,11 @@
           <c:showBubbleSize val="0"/>
         </c:dLbls>
         <c:gapWidth val="150"/>
-        <c:axId val="76548736"/>
-        <c:axId val="85094784"/>
+        <c:axId val="68161536"/>
+        <c:axId val="68163072"/>
       </c:barChart>
       <c:catAx>
-        <c:axId val="76548736"/>
+        <c:axId val="68161536"/>
         <c:scaling>
           <c:orientation val="minMax"/>
         </c:scaling>
@@ -261,7 +261,7 @@
         <c:majorTickMark val="out"/>
         <c:minorTickMark val="none"/>
         <c:tickLblPos val="nextTo"/>
-        <c:crossAx val="85094784"/>
+        <c:crossAx val="68163072"/>
         <c:crosses val="autoZero"/>
         <c:auto val="1"/>
         <c:lblAlgn val="ctr"/>
@@ -269,7 +269,7 @@
         <c:noMultiLvlLbl val="0"/>
       </c:catAx>
       <c:valAx>
-        <c:axId val="85094784"/>
+        <c:axId val="68163072"/>
         <c:scaling>
           <c:orientation val="minMax"/>
         </c:scaling>
@@ -280,7 +280,7 @@
         <c:majorTickMark val="out"/>
         <c:minorTickMark val="none"/>
         <c:tickLblPos val="nextTo"/>
-        <c:crossAx val="76548736"/>
+        <c:crossAx val="68161536"/>
         <c:crosses val="autoZero"/>
         <c:crossBetween val="between"/>
       </c:valAx>
@@ -423,11 +423,11 @@
           <c:showBubbleSize val="0"/>
         </c:dLbls>
         <c:gapWidth val="150"/>
-        <c:axId val="85129856"/>
-        <c:axId val="85008768"/>
+        <c:axId val="68206592"/>
+        <c:axId val="68208128"/>
       </c:barChart>
       <c:catAx>
-        <c:axId val="85129856"/>
+        <c:axId val="68206592"/>
         <c:scaling>
           <c:orientation val="minMax"/>
         </c:scaling>
@@ -436,7 +436,7 @@
         <c:majorTickMark val="out"/>
         <c:minorTickMark val="none"/>
         <c:tickLblPos val="nextTo"/>
-        <c:crossAx val="85008768"/>
+        <c:crossAx val="68208128"/>
         <c:crosses val="autoZero"/>
         <c:auto val="1"/>
         <c:lblAlgn val="ctr"/>
@@ -444,7 +444,7 @@
         <c:noMultiLvlLbl val="0"/>
       </c:catAx>
       <c:valAx>
-        <c:axId val="85008768"/>
+        <c:axId val="68208128"/>
         <c:scaling>
           <c:orientation val="minMax"/>
         </c:scaling>
@@ -455,7 +455,7 @@
         <c:majorTickMark val="out"/>
         <c:minorTickMark val="none"/>
         <c:tickLblPos val="nextTo"/>
-        <c:crossAx val="85129856"/>
+        <c:crossAx val="68206592"/>
         <c:crosses val="autoZero"/>
         <c:crossBetween val="between"/>
       </c:valAx>
@@ -629,11 +629,11 @@
           <c:showBubbleSize val="0"/>
         </c:dLbls>
         <c:gapWidth val="150"/>
-        <c:axId val="46709376"/>
-        <c:axId val="85049728"/>
+        <c:axId val="70479872"/>
+        <c:axId val="70481408"/>
       </c:barChart>
       <c:catAx>
-        <c:axId val="46709376"/>
+        <c:axId val="70479872"/>
         <c:scaling>
           <c:orientation val="minMax"/>
         </c:scaling>
@@ -642,7 +642,7 @@
         <c:majorTickMark val="out"/>
         <c:minorTickMark val="none"/>
         <c:tickLblPos val="nextTo"/>
-        <c:crossAx val="85049728"/>
+        <c:crossAx val="70481408"/>
         <c:crosses val="autoZero"/>
         <c:auto val="1"/>
         <c:lblAlgn val="ctr"/>
@@ -650,7 +650,7 @@
         <c:noMultiLvlLbl val="0"/>
       </c:catAx>
       <c:valAx>
-        <c:axId val="85049728"/>
+        <c:axId val="70481408"/>
         <c:scaling>
           <c:orientation val="minMax"/>
         </c:scaling>
@@ -661,7 +661,7 @@
         <c:majorTickMark val="out"/>
         <c:minorTickMark val="none"/>
         <c:tickLblPos val="nextTo"/>
-        <c:crossAx val="46709376"/>
+        <c:crossAx val="70479872"/>
         <c:crosses val="autoZero"/>
         <c:crossBetween val="between"/>
       </c:valAx>
@@ -802,7 +802,7 @@
           <a:p>
             <a:fld id="{D33F08C4-19E2-45C3-B624-C97CC54881AA}" type="datetimeFigureOut">
               <a:rPr lang="en-US" smtClean="0"/>
-              <a:t>6/1/2015</a:t>
+              <a:t>6/2/2015</a:t>
             </a:fld>
             <a:endParaRPr lang="en-US"/>
           </a:p>
@@ -4079,7 +4079,7 @@
           <a:p>
             <a:fld id="{9CBAC602-64DA-4CCD-AFCB-7521516D8C55}" type="datetimeFigureOut">
               <a:rPr lang="en-US" smtClean="0"/>
-              <a:t>6/1/2015</a:t>
+              <a:t>6/2/2015</a:t>
             </a:fld>
             <a:endParaRPr lang="en-US"/>
           </a:p>
@@ -4364,7 +4364,7 @@
           <a:p>
             <a:fld id="{9CBAC602-64DA-4CCD-AFCB-7521516D8C55}" type="datetimeFigureOut">
               <a:rPr lang="en-US" smtClean="0"/>
-              <a:t>6/1/2015</a:t>
+              <a:t>6/2/2015</a:t>
             </a:fld>
             <a:endParaRPr lang="en-US"/>
           </a:p>
@@ -4539,7 +4539,7 @@
           <a:p>
             <a:fld id="{9CBAC602-64DA-4CCD-AFCB-7521516D8C55}" type="datetimeFigureOut">
               <a:rPr lang="en-US" smtClean="0"/>
-              <a:t>6/1/2015</a:t>
+              <a:t>6/2/2015</a:t>
             </a:fld>
             <a:endParaRPr lang="en-US"/>
           </a:p>
@@ -4704,7 +4704,7 @@
           <a:p>
             <a:fld id="{9CBAC602-64DA-4CCD-AFCB-7521516D8C55}" type="datetimeFigureOut">
               <a:rPr lang="en-US" smtClean="0"/>
-              <a:t>6/1/2015</a:t>
+              <a:t>6/2/2015</a:t>
             </a:fld>
             <a:endParaRPr lang="en-US"/>
           </a:p>
@@ -4945,7 +4945,7 @@
           <a:p>
             <a:fld id="{9CBAC602-64DA-4CCD-AFCB-7521516D8C55}" type="datetimeFigureOut">
               <a:rPr lang="en-US" smtClean="0"/>
-              <a:t>6/1/2015</a:t>
+              <a:t>6/2/2015</a:t>
             </a:fld>
             <a:endParaRPr lang="en-US"/>
           </a:p>
@@ -5058,7 +5058,7 @@
           <a:p>
             <a:fld id="{9CBAC602-64DA-4CCD-AFCB-7521516D8C55}" type="datetimeFigureOut">
               <a:rPr lang="en-US" smtClean="0"/>
-              <a:t>6/1/2015</a:t>
+              <a:t>6/2/2015</a:t>
             </a:fld>
             <a:endParaRPr lang="en-US"/>
           </a:p>
@@ -5597,7 +5597,7 @@
           <a:p>
             <a:fld id="{9CBAC602-64DA-4CCD-AFCB-7521516D8C55}" type="datetimeFigureOut">
               <a:rPr lang="en-US" smtClean="0"/>
-              <a:t>6/1/2015</a:t>
+              <a:t>6/2/2015</a:t>
             </a:fld>
             <a:endParaRPr lang="en-US"/>
           </a:p>
@@ -5710,7 +5710,7 @@
           <a:p>
             <a:fld id="{9CBAC602-64DA-4CCD-AFCB-7521516D8C55}" type="datetimeFigureOut">
               <a:rPr lang="en-US" smtClean="0"/>
-              <a:t>6/1/2015</a:t>
+              <a:t>6/2/2015</a:t>
             </a:fld>
             <a:endParaRPr lang="en-US"/>
           </a:p>
@@ -5800,7 +5800,7 @@
           <a:p>
             <a:fld id="{9CBAC602-64DA-4CCD-AFCB-7521516D8C55}" type="datetimeFigureOut">
               <a:rPr lang="en-US" smtClean="0"/>
-              <a:t>6/1/2015</a:t>
+              <a:t>6/2/2015</a:t>
             </a:fld>
             <a:endParaRPr lang="en-US"/>
           </a:p>
@@ -8451,7 +8451,7 @@
           <a:p>
             <a:fld id="{9CBAC602-64DA-4CCD-AFCB-7521516D8C55}" type="datetimeFigureOut">
               <a:rPr lang="en-US" smtClean="0"/>
-              <a:t>6/1/2015</a:t>
+              <a:t>6/2/2015</a:t>
             </a:fld>
             <a:endParaRPr lang="en-US"/>
           </a:p>
@@ -11663,7 +11663,7 @@
           <a:p>
             <a:fld id="{9CBAC602-64DA-4CCD-AFCB-7521516D8C55}" type="datetimeFigureOut">
               <a:rPr lang="en-US" smtClean="0"/>
-              <a:t>6/1/2015</a:t>
+              <a:t>6/2/2015</a:t>
             </a:fld>
             <a:endParaRPr lang="en-US"/>
           </a:p>
@@ -14485,7 +14485,7 @@
           <a:p>
             <a:fld id="{9CBAC602-64DA-4CCD-AFCB-7521516D8C55}" type="datetimeFigureOut">
               <a:rPr lang="en-US" smtClean="0"/>
-              <a:t>6/1/2015</a:t>
+              <a:t>6/2/2015</a:t>
             </a:fld>
             <a:endParaRPr lang="en-US"/>
           </a:p>
@@ -15576,10 +15576,6 @@
               </a:rPr>
               <a:t>Example of database</a:t>
             </a:r>
-            <a:endParaRPr lang="en-US" dirty="0" smtClean="0">
-              <a:latin typeface="Arial" pitchFamily="34" charset="0"/>
-              <a:cs typeface="Arial" pitchFamily="34" charset="0"/>
-            </a:endParaRPr>
           </a:p>
         </p:txBody>
       </p:sp>
@@ -15610,14 +15606,7 @@
                 <a:latin typeface="Arial" pitchFamily="34" charset="0"/>
                 <a:cs typeface="Arial" pitchFamily="34" charset="0"/>
               </a:rPr>
-              <a:t>A </a:t>
-            </a:r>
-            <a:r>
-              <a:rPr lang="en-US" dirty="0" smtClean="0">
-                <a:latin typeface="Arial" pitchFamily="34" charset="0"/>
-                <a:cs typeface="Arial" pitchFamily="34" charset="0"/>
-              </a:rPr>
-              <a:t>two-dimensional </a:t>
+              <a:t>A two-dimensional </a:t>
             </a:r>
             <a:r>
               <a:rPr lang="en-US" dirty="0">
@@ -15801,14 +15790,7 @@
                 <a:latin typeface="Arial" pitchFamily="34" charset="0"/>
                 <a:cs typeface="Arial" pitchFamily="34" charset="0"/>
               </a:rPr>
-              <a:t>Database </a:t>
-            </a:r>
-            <a:r>
-              <a:rPr lang="en-US" dirty="0" smtClean="0">
-                <a:latin typeface="Arial" pitchFamily="34" charset="0"/>
-                <a:cs typeface="Arial" pitchFamily="34" charset="0"/>
-              </a:rPr>
-              <a:t>Management System</a:t>
+              <a:t>Database Management System</a:t>
             </a:r>
           </a:p>
           <a:p>
@@ -21647,7 +21629,7 @@
         </p:nvGraphicFramePr>
         <p:xfrm>
           <a:off x="6324600" y="3657600"/>
-          <a:ext cx="1981200" cy="609600"/>
+          <a:ext cx="1981200" cy="621411"/>
         </p:xfrm>
         <a:graphic>
           <a:graphicData uri="http://schemas.openxmlformats.org/drawingml/2006/table">
@@ -25987,7 +25969,7 @@
         </p:nvGraphicFramePr>
         <p:xfrm>
           <a:off x="6553200" y="5029200"/>
-          <a:ext cx="2057400" cy="567690"/>
+          <a:ext cx="2057400" cy="569976"/>
         </p:xfrm>
         <a:graphic>
           <a:graphicData uri="http://schemas.openxmlformats.org/drawingml/2006/table">
@@ -27754,7 +27736,7 @@
           <p:nvPr>
             <p:extLst>
               <p:ext uri="{D42A27DB-BD31-4B8C-83A1-F6EECF244321}">
-                <p14:modId xmlns:p14="http://schemas.microsoft.com/office/powerpoint/2010/main" val="2822353198"/>
+                <p14:modId xmlns:p14="http://schemas.microsoft.com/office/powerpoint/2010/main" val="2002899530"/>
               </p:ext>
             </p:extLst>
           </p:nvPr>
@@ -27767,7 +27749,7 @@
           <a:graphicData uri="http://schemas.openxmlformats.org/drawingml/2006/table">
             <a:tbl>
               <a:tblPr firstRow="1" bandRow="1">
-                <a:tableStyleId>{5C22544A-7EE6-4342-B048-85BDC9FD1C3A}</a:tableStyleId>
+                <a:tableStyleId>{F5AB1C69-6EDB-4FF4-983F-18BD219EF322}</a:tableStyleId>
               </a:tblPr>
               <a:tblGrid>
                 <a:gridCol w="1524001"/>
@@ -27890,7 +27872,7 @@
                     <a:bodyPr/>
                     <a:lstStyle/>
                     <a:p>
-                      <a:endParaRPr lang="en-US"/>
+                      <a:endParaRPr lang="en-US" dirty="0"/>
                     </a:p>
                   </a:txBody>
                   <a:tcPr/>
@@ -28158,7 +28140,7 @@
                     <a:bodyPr/>
                     <a:lstStyle/>
                     <a:p>
-                      <a:endParaRPr lang="en-US"/>
+                      <a:endParaRPr lang="en-US" dirty="0"/>
                     </a:p>
                   </a:txBody>
                   <a:tcPr/>
@@ -28428,7 +28410,7 @@
           <p:nvPr>
             <p:extLst>
               <p:ext uri="{D42A27DB-BD31-4B8C-83A1-F6EECF244321}">
-                <p14:modId xmlns:p14="http://schemas.microsoft.com/office/powerpoint/2010/main" val="1425969992"/>
+                <p14:modId xmlns:p14="http://schemas.microsoft.com/office/powerpoint/2010/main" val="899661667"/>
               </p:ext>
             </p:extLst>
           </p:nvPr>
@@ -28441,7 +28423,7 @@
           <a:graphicData uri="http://schemas.openxmlformats.org/drawingml/2006/table">
             <a:tbl>
               <a:tblPr firstRow="1" bandRow="1">
-                <a:tableStyleId>{5C22544A-7EE6-4342-B048-85BDC9FD1C3A}</a:tableStyleId>
+                <a:tableStyleId>{F5AB1C69-6EDB-4FF4-983F-18BD219EF322}</a:tableStyleId>
               </a:tblPr>
               <a:tblGrid>
                 <a:gridCol w="2081102"/>
@@ -28899,7 +28881,7 @@
                     <a:bodyPr/>
                     <a:lstStyle/>
                     <a:p>
-                      <a:endParaRPr lang="en-US"/>
+                      <a:endParaRPr lang="en-US" dirty="0"/>
                     </a:p>
                   </a:txBody>
                   <a:tcPr/>
@@ -29089,53 +29071,32 @@
                 <a:latin typeface="Arial" pitchFamily="34" charset="0"/>
                 <a:cs typeface="Arial" pitchFamily="34" charset="0"/>
               </a:rPr>
-              <a:t>Using </a:t>
+              <a:t>Using the materialized view for rewrite the same query but simpler</a:t>
             </a:r>
+            <a:endParaRPr lang="en-US" sz="2000" dirty="0">
+              <a:latin typeface="Arial" pitchFamily="34" charset="0"/>
+              <a:cs typeface="Arial" pitchFamily="34" charset="0"/>
+            </a:endParaRPr>
+          </a:p>
+          <a:p>
+            <a:endParaRPr lang="en-US" sz="2000" dirty="0" smtClean="0">
+              <a:latin typeface="Arial" pitchFamily="34" charset="0"/>
+              <a:cs typeface="Arial" pitchFamily="34" charset="0"/>
+            </a:endParaRPr>
+          </a:p>
+          <a:p>
+            <a:endParaRPr lang="en-US" sz="2000" dirty="0" smtClean="0">
+              <a:latin typeface="Arial" pitchFamily="34" charset="0"/>
+              <a:cs typeface="Arial" pitchFamily="34" charset="0"/>
+            </a:endParaRPr>
+          </a:p>
+          <a:p>
             <a:r>
               <a:rPr lang="en-US" sz="2000" dirty="0" smtClean="0">
                 <a:latin typeface="Arial" pitchFamily="34" charset="0"/>
                 <a:cs typeface="Arial" pitchFamily="34" charset="0"/>
               </a:rPr>
-              <a:t>the materialized view for rewrite the same query </a:t>
-            </a:r>
-            <a:r>
-              <a:rPr lang="en-US" sz="2000" dirty="0" smtClean="0">
-                <a:latin typeface="Arial" pitchFamily="34" charset="0"/>
-                <a:cs typeface="Arial" pitchFamily="34" charset="0"/>
-              </a:rPr>
-              <a:t>but simpler</a:t>
-            </a:r>
-            <a:endParaRPr lang="en-US" sz="2000" dirty="0">
-              <a:latin typeface="Arial" pitchFamily="34" charset="0"/>
-              <a:cs typeface="Arial" pitchFamily="34" charset="0"/>
-            </a:endParaRPr>
-          </a:p>
-          <a:p>
-            <a:endParaRPr lang="en-US" sz="2000" dirty="0" smtClean="0">
-              <a:latin typeface="Arial" pitchFamily="34" charset="0"/>
-              <a:cs typeface="Arial" pitchFamily="34" charset="0"/>
-            </a:endParaRPr>
-          </a:p>
-          <a:p>
-            <a:endParaRPr lang="en-US" sz="2000" dirty="0" smtClean="0">
-              <a:latin typeface="Arial" pitchFamily="34" charset="0"/>
-              <a:cs typeface="Arial" pitchFamily="34" charset="0"/>
-            </a:endParaRPr>
-          </a:p>
-          <a:p>
-            <a:r>
-              <a:rPr lang="en-US" sz="2000" dirty="0" smtClean="0">
-                <a:latin typeface="Arial" pitchFamily="34" charset="0"/>
-                <a:cs typeface="Arial" pitchFamily="34" charset="0"/>
-              </a:rPr>
-              <a:t>The query rewrite </a:t>
-            </a:r>
-            <a:r>
-              <a:rPr lang="en-US" sz="2000" dirty="0" smtClean="0">
-                <a:latin typeface="Arial" pitchFamily="34" charset="0"/>
-                <a:cs typeface="Arial" pitchFamily="34" charset="0"/>
-              </a:rPr>
-              <a:t>does not </a:t>
+              <a:t>The query rewrite does not </a:t>
             </a:r>
             <a:r>
               <a:rPr lang="en-US" sz="2000" dirty="0" err="1" smtClean="0">
@@ -29149,21 +29110,7 @@
                 <a:latin typeface="Arial" pitchFamily="34" charset="0"/>
                 <a:cs typeface="Arial" pitchFamily="34" charset="0"/>
               </a:rPr>
-              <a:t>, therefore it’s </a:t>
-            </a:r>
-            <a:r>
-              <a:rPr lang="en-US" sz="2000" dirty="0" smtClean="0">
-                <a:latin typeface="Arial" pitchFamily="34" charset="0"/>
-                <a:cs typeface="Arial" pitchFamily="34" charset="0"/>
-              </a:rPr>
-              <a:t>runs </a:t>
-            </a:r>
-            <a:r>
-              <a:rPr lang="en-US" sz="2000" dirty="0" smtClean="0">
-                <a:latin typeface="Arial" pitchFamily="34" charset="0"/>
-                <a:cs typeface="Arial" pitchFamily="34" charset="0"/>
-              </a:rPr>
-              <a:t>faster than the first query </a:t>
+              <a:t>, therefore it’s runs faster than the first query </a:t>
             </a:r>
           </a:p>
           <a:p>
@@ -31204,14 +31151,7 @@
                 <a:latin typeface="Arial" pitchFamily="34" charset="0"/>
                 <a:cs typeface="Arial" pitchFamily="34" charset="0"/>
               </a:rPr>
-              <a:t>4,000 </a:t>
-            </a:r>
-            <a:r>
-              <a:rPr lang="en-US" dirty="0" smtClean="0">
-                <a:latin typeface="Arial" pitchFamily="34" charset="0"/>
-                <a:cs typeface="Arial" pitchFamily="34" charset="0"/>
-              </a:rPr>
-              <a:t>rows</a:t>
+              <a:t>4,000 rows</a:t>
             </a:r>
             <a:endParaRPr lang="en-US" dirty="0">
               <a:latin typeface="Arial" pitchFamily="34" charset="0"/>
@@ -31452,28 +31392,7 @@
                 <a:latin typeface="Arial" pitchFamily="34" charset="0"/>
                 <a:cs typeface="Arial" pitchFamily="34" charset="0"/>
               </a:rPr>
-              <a:t>Performance Comparisons between </a:t>
-            </a:r>
-            <a:r>
-              <a:rPr lang="en-US" sz="9600" dirty="0" smtClean="0">
-                <a:latin typeface="Arial" pitchFamily="34" charset="0"/>
-                <a:cs typeface="Arial" pitchFamily="34" charset="0"/>
-              </a:rPr>
-              <a:t>MySQL </a:t>
-            </a:r>
-            <a:r>
-              <a:rPr lang="en-US" sz="9600" dirty="0" smtClean="0">
-                <a:latin typeface="Arial" pitchFamily="34" charset="0"/>
-                <a:cs typeface="Arial" pitchFamily="34" charset="0"/>
-              </a:rPr>
-              <a:t>and </a:t>
-            </a:r>
-            <a:r>
-              <a:rPr lang="en-US" sz="9600" dirty="0" smtClean="0">
-                <a:latin typeface="Arial" pitchFamily="34" charset="0"/>
-                <a:cs typeface="Arial" pitchFamily="34" charset="0"/>
-              </a:rPr>
-              <a:t>MonetDB</a:t>
+              <a:t>Performance Comparisons between MySQL and MonetDB</a:t>
             </a:r>
           </a:p>
           <a:p>
@@ -33542,8 +33461,15 @@
                 <a:latin typeface="Arial" pitchFamily="34" charset="0"/>
                 <a:cs typeface="Arial" pitchFamily="34" charset="0"/>
               </a:rPr>
-              <a:t>Thank you for your attention</a:t>
+              <a:t>Merci beaucoup !</a:t>
             </a:r>
+            <a:endParaRPr lang="en-US" sz="2800" b="1" dirty="0" smtClean="0">
+              <a:solidFill>
+                <a:schemeClr val="tx2"/>
+              </a:solidFill>
+              <a:latin typeface="Arial" pitchFamily="34" charset="0"/>
+              <a:cs typeface="Arial" pitchFamily="34" charset="0"/>
+            </a:endParaRPr>
           </a:p>
           <a:p>
             <a:pPr algn="ctr"/>
@@ -33932,14 +33858,7 @@
                 <a:latin typeface="Arial" pitchFamily="34" charset="0"/>
                 <a:cs typeface="Arial" pitchFamily="34" charset="0"/>
               </a:rPr>
-              <a:t>Variety: Different </a:t>
-            </a:r>
-            <a:r>
-              <a:rPr lang="en-US" dirty="0" smtClean="0">
-                <a:latin typeface="Arial" pitchFamily="34" charset="0"/>
-                <a:cs typeface="Arial" pitchFamily="34" charset="0"/>
-              </a:rPr>
-              <a:t>type of data</a:t>
+              <a:t>Variety: Different type of data</a:t>
             </a:r>
             <a:endParaRPr lang="en-US" dirty="0">
               <a:latin typeface="Arial" pitchFamily="34" charset="0"/>
@@ -33983,21 +33902,7 @@
                 <a:latin typeface="Arial" pitchFamily="34" charset="0"/>
                 <a:cs typeface="Arial" pitchFamily="34" charset="0"/>
               </a:rPr>
-              <a:t>Volume</a:t>
-            </a:r>
-            <a:r>
-              <a:rPr lang="en-US" dirty="0" smtClean="0">
-                <a:latin typeface="Arial" pitchFamily="34" charset="0"/>
-                <a:cs typeface="Arial" pitchFamily="34" charset="0"/>
-              </a:rPr>
-              <a:t>: Data increase all </a:t>
-            </a:r>
-            <a:r>
-              <a:rPr lang="en-US" dirty="0" smtClean="0">
-                <a:latin typeface="Arial" pitchFamily="34" charset="0"/>
-                <a:cs typeface="Arial" pitchFamily="34" charset="0"/>
-              </a:rPr>
-              <a:t>time</a:t>
+              <a:t>Volume: Data increase all time</a:t>
             </a:r>
           </a:p>
           <a:p>
@@ -34033,14 +33938,7 @@
                 <a:latin typeface="Arial" pitchFamily="34" charset="0"/>
                 <a:cs typeface="Arial" pitchFamily="34" charset="0"/>
               </a:rPr>
-              <a:t>Velocity</a:t>
-            </a:r>
-            <a:r>
-              <a:rPr lang="en-US" dirty="0" smtClean="0">
-                <a:latin typeface="Arial" pitchFamily="34" charset="0"/>
-                <a:cs typeface="Arial" pitchFamily="34" charset="0"/>
-              </a:rPr>
-              <a:t>: Need to be faster</a:t>
+              <a:t>Velocity: Need to be faster</a:t>
             </a:r>
           </a:p>
           <a:p>
@@ -35491,11 +35389,11 @@
   <p:clrMapOvr>
     <a:masterClrMapping/>
   </p:clrMapOvr>
-  <mc:AlternateContent xmlns:mc="http://schemas.openxmlformats.org/markup-compatibility/2006">
-    <mc:Choice xmlns:p14="http://schemas.microsoft.com/office/powerpoint/2010/main" Requires="p14">
+  <mc:AlternateContent xmlns:mc="http://schemas.openxmlformats.org/markup-compatibility/2006" xmlns:p14="http://schemas.microsoft.com/office/powerpoint/2010/main">
+    <mc:Choice Requires="p14">
       <p:transition spd="slow" p14:dur="2000"/>
     </mc:Choice>
-    <mc:Fallback>
+    <mc:Fallback xmlns="">
       <p:transition spd="slow"/>
     </mc:Fallback>
   </mc:AlternateContent>
@@ -35792,14 +35690,7 @@
                 <a:latin typeface="Arial" pitchFamily="34" charset="0"/>
                 <a:cs typeface="Arial" pitchFamily="34" charset="0"/>
               </a:rPr>
-              <a:t>The relational model, first proposed in 1970 by Dr. </a:t>
-            </a:r>
-            <a:r>
-              <a:rPr lang="en-US" dirty="0">
-                <a:latin typeface="Arial" pitchFamily="34" charset="0"/>
-                <a:cs typeface="Arial" pitchFamily="34" charset="0"/>
-              </a:rPr>
-              <a:t>Edgar Frank </a:t>
+              <a:t>The relational model, first proposed in 1970 by Dr. Edgar Frank </a:t>
             </a:r>
             <a:r>
               <a:rPr lang="en-US" dirty="0" smtClean="0">

</xml_diff>

<commit_message>
Modification and multi answer
</commit_message>
<xml_diff>
--- a/slides/MonetDB workshop.pptx
+++ b/slides/MonetDB workshop.pptx
@@ -248,11 +248,11 @@
           <c:showBubbleSize val="0"/>
         </c:dLbls>
         <c:gapWidth val="150"/>
-        <c:axId val="68161536"/>
-        <c:axId val="68163072"/>
+        <c:axId val="68850048"/>
+        <c:axId val="68851584"/>
       </c:barChart>
       <c:catAx>
-        <c:axId val="68161536"/>
+        <c:axId val="68850048"/>
         <c:scaling>
           <c:orientation val="minMax"/>
         </c:scaling>
@@ -261,7 +261,7 @@
         <c:majorTickMark val="out"/>
         <c:minorTickMark val="none"/>
         <c:tickLblPos val="nextTo"/>
-        <c:crossAx val="68163072"/>
+        <c:crossAx val="68851584"/>
         <c:crosses val="autoZero"/>
         <c:auto val="1"/>
         <c:lblAlgn val="ctr"/>
@@ -269,7 +269,7 @@
         <c:noMultiLvlLbl val="0"/>
       </c:catAx>
       <c:valAx>
-        <c:axId val="68163072"/>
+        <c:axId val="68851584"/>
         <c:scaling>
           <c:orientation val="minMax"/>
         </c:scaling>
@@ -280,7 +280,7 @@
         <c:majorTickMark val="out"/>
         <c:minorTickMark val="none"/>
         <c:tickLblPos val="nextTo"/>
-        <c:crossAx val="68161536"/>
+        <c:crossAx val="68850048"/>
         <c:crosses val="autoZero"/>
         <c:crossBetween val="between"/>
       </c:valAx>
@@ -423,11 +423,11 @@
           <c:showBubbleSize val="0"/>
         </c:dLbls>
         <c:gapWidth val="150"/>
-        <c:axId val="68206592"/>
-        <c:axId val="68208128"/>
+        <c:axId val="73707904"/>
+        <c:axId val="73709440"/>
       </c:barChart>
       <c:catAx>
-        <c:axId val="68206592"/>
+        <c:axId val="73707904"/>
         <c:scaling>
           <c:orientation val="minMax"/>
         </c:scaling>
@@ -436,7 +436,7 @@
         <c:majorTickMark val="out"/>
         <c:minorTickMark val="none"/>
         <c:tickLblPos val="nextTo"/>
-        <c:crossAx val="68208128"/>
+        <c:crossAx val="73709440"/>
         <c:crosses val="autoZero"/>
         <c:auto val="1"/>
         <c:lblAlgn val="ctr"/>
@@ -444,7 +444,7 @@
         <c:noMultiLvlLbl val="0"/>
       </c:catAx>
       <c:valAx>
-        <c:axId val="68208128"/>
+        <c:axId val="73709440"/>
         <c:scaling>
           <c:orientation val="minMax"/>
         </c:scaling>
@@ -455,7 +455,7 @@
         <c:majorTickMark val="out"/>
         <c:minorTickMark val="none"/>
         <c:tickLblPos val="nextTo"/>
-        <c:crossAx val="68206592"/>
+        <c:crossAx val="73707904"/>
         <c:crosses val="autoZero"/>
         <c:crossBetween val="between"/>
       </c:valAx>
@@ -629,11 +629,11 @@
           <c:showBubbleSize val="0"/>
         </c:dLbls>
         <c:gapWidth val="150"/>
-        <c:axId val="70479872"/>
-        <c:axId val="70481408"/>
+        <c:axId val="75194752"/>
+        <c:axId val="75196288"/>
       </c:barChart>
       <c:catAx>
-        <c:axId val="70479872"/>
+        <c:axId val="75194752"/>
         <c:scaling>
           <c:orientation val="minMax"/>
         </c:scaling>
@@ -642,7 +642,7 @@
         <c:majorTickMark val="out"/>
         <c:minorTickMark val="none"/>
         <c:tickLblPos val="nextTo"/>
-        <c:crossAx val="70481408"/>
+        <c:crossAx val="75196288"/>
         <c:crosses val="autoZero"/>
         <c:auto val="1"/>
         <c:lblAlgn val="ctr"/>
@@ -650,7 +650,7 @@
         <c:noMultiLvlLbl val="0"/>
       </c:catAx>
       <c:valAx>
-        <c:axId val="70481408"/>
+        <c:axId val="75196288"/>
         <c:scaling>
           <c:orientation val="minMax"/>
         </c:scaling>
@@ -661,7 +661,7 @@
         <c:majorTickMark val="out"/>
         <c:minorTickMark val="none"/>
         <c:tickLblPos val="nextTo"/>
-        <c:crossAx val="70479872"/>
+        <c:crossAx val="75194752"/>
         <c:crosses val="autoZero"/>
         <c:crossBetween val="between"/>
       </c:valAx>
@@ -26993,7 +26993,7 @@
         <p:spPr>
           <a:xfrm>
             <a:off x="914400" y="1295400"/>
-            <a:ext cx="6777317" cy="5105400"/>
+            <a:ext cx="7315200" cy="5105400"/>
           </a:xfrm>
           <a:prstGeom prst="rect">
             <a:avLst/>
@@ -27671,7 +27671,7 @@
         </p:nvSpPr>
         <p:spPr>
           <a:xfrm>
-            <a:off x="2574556" y="721667"/>
+            <a:off x="2743839" y="950266"/>
             <a:ext cx="3656322" cy="461665"/>
           </a:xfrm>
           <a:prstGeom prst="rect">
@@ -27736,7 +27736,7 @@
           <p:nvPr>
             <p:extLst>
               <p:ext uri="{D42A27DB-BD31-4B8C-83A1-F6EECF244321}">
-                <p14:modId xmlns:p14="http://schemas.microsoft.com/office/powerpoint/2010/main" val="2002899530"/>
+                <p14:modId xmlns:p14="http://schemas.microsoft.com/office/powerpoint/2010/main" val="749588089"/>
               </p:ext>
             </p:extLst>
           </p:nvPr>
@@ -28199,7 +28199,7 @@
                       </a:r>
                       <a:r>
                         <a:rPr lang="en-US" baseline="0" dirty="0" smtClean="0"/>
-                        <a:t> 000</a:t>
+                        <a:t>000</a:t>
                       </a:r>
                       <a:endParaRPr lang="en-US" dirty="0"/>
                     </a:p>
@@ -28345,7 +28345,7 @@
         </p:nvSpPr>
         <p:spPr>
           <a:xfrm>
-            <a:off x="2703598" y="721667"/>
+            <a:off x="2872880" y="838200"/>
             <a:ext cx="3398239" cy="461665"/>
           </a:xfrm>
           <a:prstGeom prst="rect">
@@ -29035,7 +29035,7 @@
         </p:nvSpPr>
         <p:spPr>
           <a:xfrm>
-            <a:off x="1043492" y="914400"/>
+            <a:off x="1183341" y="914400"/>
             <a:ext cx="6777317" cy="4437352"/>
           </a:xfrm>
         </p:spPr>
@@ -32475,13 +32475,13 @@
           <p:nvPr>
             <p:extLst>
               <p:ext uri="{D42A27DB-BD31-4B8C-83A1-F6EECF244321}">
-                <p14:modId xmlns:p14="http://schemas.microsoft.com/office/powerpoint/2010/main" val="2765963157"/>
+                <p14:modId xmlns:p14="http://schemas.microsoft.com/office/powerpoint/2010/main" val="3417544889"/>
               </p:ext>
             </p:extLst>
           </p:nvPr>
         </p:nvGraphicFramePr>
         <p:xfrm>
-          <a:off x="1666332" y="2590800"/>
+          <a:off x="1518966" y="2578795"/>
           <a:ext cx="6106068" cy="3505200"/>
         </p:xfrm>
         <a:graphic>
@@ -33280,7 +33280,7 @@
         </p:nvSpPr>
         <p:spPr>
           <a:xfrm>
-            <a:off x="990600" y="1219200"/>
+            <a:off x="1182252" y="1219200"/>
             <a:ext cx="6777317" cy="3886201"/>
           </a:xfrm>
         </p:spPr>
@@ -33463,13 +33463,6 @@
               </a:rPr>
               <a:t>Merci beaucoup !</a:t>
             </a:r>
-            <a:endParaRPr lang="en-US" sz="2800" b="1" dirty="0" smtClean="0">
-              <a:solidFill>
-                <a:schemeClr val="tx2"/>
-              </a:solidFill>
-              <a:latin typeface="Arial" pitchFamily="34" charset="0"/>
-              <a:cs typeface="Arial" pitchFamily="34" charset="0"/>
-            </a:endParaRPr>
           </a:p>
           <a:p>
             <a:pPr algn="ctr"/>
@@ -33813,7 +33806,7 @@
         </p:blipFill>
         <p:spPr bwMode="auto">
           <a:xfrm>
-            <a:off x="5389562" y="5448300"/>
+            <a:off x="917575" y="350119"/>
             <a:ext cx="3154362" cy="1054819"/>
           </a:xfrm>
           <a:prstGeom prst="rect">
@@ -33843,7 +33836,7 @@
         </p:nvSpPr>
         <p:spPr>
           <a:xfrm>
-            <a:off x="1040466" y="1227137"/>
+            <a:off x="1069975" y="1450975"/>
             <a:ext cx="6777317" cy="4918229"/>
           </a:xfrm>
         </p:spPr>
@@ -33938,8 +33931,19 @@
                 <a:latin typeface="Arial" pitchFamily="34" charset="0"/>
                 <a:cs typeface="Arial" pitchFamily="34" charset="0"/>
               </a:rPr>
-              <a:t>Velocity: Need to be faster</a:t>
+              <a:t>Velocity: </a:t>
             </a:r>
+            <a:r>
+              <a:rPr lang="en-US" dirty="0" smtClean="0">
+                <a:latin typeface="Arial" pitchFamily="34" charset="0"/>
+                <a:cs typeface="Arial" pitchFamily="34" charset="0"/>
+              </a:rPr>
+              <a:t>The data need to be treated now ? Or later ?</a:t>
+            </a:r>
+            <a:endParaRPr lang="en-US" dirty="0" smtClean="0">
+              <a:latin typeface="Arial" pitchFamily="34" charset="0"/>
+              <a:cs typeface="Arial" pitchFamily="34" charset="0"/>
+            </a:endParaRPr>
           </a:p>
           <a:p>
             <a:pPr marL="68580" indent="0">
@@ -34518,7 +34522,7 @@
         </p:blipFill>
         <p:spPr bwMode="auto">
           <a:xfrm>
-            <a:off x="2628900" y="1993108"/>
+            <a:off x="3200400" y="2183608"/>
             <a:ext cx="677862" cy="677862"/>
           </a:xfrm>
           <a:prstGeom prst="rect">
@@ -34559,7 +34563,7 @@
         </p:blipFill>
         <p:spPr bwMode="auto">
           <a:xfrm>
-            <a:off x="3817938" y="1993108"/>
+            <a:off x="4740275" y="2179639"/>
             <a:ext cx="677862" cy="677862"/>
           </a:xfrm>
           <a:prstGeom prst="rect">
@@ -34600,7 +34604,7 @@
         </p:blipFill>
         <p:spPr bwMode="auto">
           <a:xfrm>
-            <a:off x="5050631" y="1993108"/>
+            <a:off x="6324600" y="2179638"/>
             <a:ext cx="677863" cy="677863"/>
           </a:xfrm>
           <a:prstGeom prst="rect">
@@ -34641,7 +34645,7 @@
         </p:blipFill>
         <p:spPr bwMode="auto">
           <a:xfrm>
-            <a:off x="1431772" y="1993108"/>
+            <a:off x="1574647" y="2179638"/>
             <a:ext cx="705003" cy="677862"/>
           </a:xfrm>
           <a:prstGeom prst="rect">
@@ -34682,7 +34686,7 @@
         </p:blipFill>
         <p:spPr bwMode="auto">
           <a:xfrm>
-            <a:off x="3080147" y="3581400"/>
+            <a:off x="3306762" y="3810000"/>
             <a:ext cx="2153444" cy="1600082"/>
           </a:xfrm>
           <a:prstGeom prst="rect">

</xml_diff>